<commit_message>
feat : Entity 설계
</commit_message>
<xml_diff>
--- a/인터페이스 문서/7주차/0418_국창훈.pptx
+++ b/인터페이스 문서/7주차/0418_국창훈.pptx
@@ -231,7 +231,7 @@
           <a:p>
             <a:fld id="{12993857-6AB4-4AA6-AD6D-3606003946AA}" type="datetimeFigureOut">
               <a:rPr lang="ko-KR" altLang="en-US" smtClean="0"/>
-              <a:t>2023-04-18</a:t>
+              <a:t>2023-04-23</a:t>
             </a:fld>
             <a:endParaRPr lang="ko-KR" altLang="en-US"/>
           </a:p>
@@ -4685,7 +4685,7 @@
           <a:p>
             <a:fld id="{5994A74A-E283-4521-BB29-607F83CF78F4}" type="datetimeFigureOut">
               <a:rPr lang="ko-KR" altLang="en-US" smtClean="0"/>
-              <a:t>2023-04-18</a:t>
+              <a:t>2023-04-23</a:t>
             </a:fld>
             <a:endParaRPr lang="ko-KR" altLang="en-US"/>
           </a:p>
@@ -4883,7 +4883,7 @@
           <a:p>
             <a:fld id="{5994A74A-E283-4521-BB29-607F83CF78F4}" type="datetimeFigureOut">
               <a:rPr lang="ko-KR" altLang="en-US" smtClean="0"/>
-              <a:t>2023-04-18</a:t>
+              <a:t>2023-04-23</a:t>
             </a:fld>
             <a:endParaRPr lang="ko-KR" altLang="en-US"/>
           </a:p>
@@ -5091,7 +5091,7 @@
           <a:p>
             <a:fld id="{5994A74A-E283-4521-BB29-607F83CF78F4}" type="datetimeFigureOut">
               <a:rPr lang="ko-KR" altLang="en-US" smtClean="0"/>
-              <a:t>2023-04-18</a:t>
+              <a:t>2023-04-23</a:t>
             </a:fld>
             <a:endParaRPr lang="ko-KR" altLang="en-US"/>
           </a:p>
@@ -5289,7 +5289,7 @@
           <a:p>
             <a:fld id="{5994A74A-E283-4521-BB29-607F83CF78F4}" type="datetimeFigureOut">
               <a:rPr lang="ko-KR" altLang="en-US" smtClean="0"/>
-              <a:t>2023-04-18</a:t>
+              <a:t>2023-04-23</a:t>
             </a:fld>
             <a:endParaRPr lang="ko-KR" altLang="en-US"/>
           </a:p>
@@ -5564,7 +5564,7 @@
           <a:p>
             <a:fld id="{5994A74A-E283-4521-BB29-607F83CF78F4}" type="datetimeFigureOut">
               <a:rPr lang="ko-KR" altLang="en-US" smtClean="0"/>
-              <a:t>2023-04-18</a:t>
+              <a:t>2023-04-23</a:t>
             </a:fld>
             <a:endParaRPr lang="ko-KR" altLang="en-US"/>
           </a:p>
@@ -5829,7 +5829,7 @@
           <a:p>
             <a:fld id="{5994A74A-E283-4521-BB29-607F83CF78F4}" type="datetimeFigureOut">
               <a:rPr lang="ko-KR" altLang="en-US" smtClean="0"/>
-              <a:t>2023-04-18</a:t>
+              <a:t>2023-04-23</a:t>
             </a:fld>
             <a:endParaRPr lang="ko-KR" altLang="en-US"/>
           </a:p>
@@ -6241,7 +6241,7 @@
           <a:p>
             <a:fld id="{5994A74A-E283-4521-BB29-607F83CF78F4}" type="datetimeFigureOut">
               <a:rPr lang="ko-KR" altLang="en-US" smtClean="0"/>
-              <a:t>2023-04-18</a:t>
+              <a:t>2023-04-23</a:t>
             </a:fld>
             <a:endParaRPr lang="ko-KR" altLang="en-US"/>
           </a:p>
@@ -6382,7 +6382,7 @@
           <a:p>
             <a:fld id="{5994A74A-E283-4521-BB29-607F83CF78F4}" type="datetimeFigureOut">
               <a:rPr lang="ko-KR" altLang="en-US" smtClean="0"/>
-              <a:t>2023-04-18</a:t>
+              <a:t>2023-04-23</a:t>
             </a:fld>
             <a:endParaRPr lang="ko-KR" altLang="en-US"/>
           </a:p>
@@ -6495,7 +6495,7 @@
           <a:p>
             <a:fld id="{5994A74A-E283-4521-BB29-607F83CF78F4}" type="datetimeFigureOut">
               <a:rPr lang="ko-KR" altLang="en-US" smtClean="0"/>
-              <a:t>2023-04-18</a:t>
+              <a:t>2023-04-23</a:t>
             </a:fld>
             <a:endParaRPr lang="ko-KR" altLang="en-US"/>
           </a:p>
@@ -6806,7 +6806,7 @@
           <a:p>
             <a:fld id="{5994A74A-E283-4521-BB29-607F83CF78F4}" type="datetimeFigureOut">
               <a:rPr lang="ko-KR" altLang="en-US" smtClean="0"/>
-              <a:t>2023-04-18</a:t>
+              <a:t>2023-04-23</a:t>
             </a:fld>
             <a:endParaRPr lang="ko-KR" altLang="en-US"/>
           </a:p>
@@ -7094,7 +7094,7 @@
           <a:p>
             <a:fld id="{5994A74A-E283-4521-BB29-607F83CF78F4}" type="datetimeFigureOut">
               <a:rPr lang="ko-KR" altLang="en-US" smtClean="0"/>
-              <a:t>2023-04-18</a:t>
+              <a:t>2023-04-23</a:t>
             </a:fld>
             <a:endParaRPr lang="ko-KR" altLang="en-US"/>
           </a:p>
@@ -7335,7 +7335,7 @@
           <a:p>
             <a:fld id="{5994A74A-E283-4521-BB29-607F83CF78F4}" type="datetimeFigureOut">
               <a:rPr lang="ko-KR" altLang="en-US" smtClean="0"/>
-              <a:t>2023-04-18</a:t>
+              <a:t>2023-04-23</a:t>
             </a:fld>
             <a:endParaRPr lang="ko-KR" altLang="en-US"/>
           </a:p>
@@ -13843,7 +13843,7 @@
           <p:nvPr>
             <p:extLst>
               <p:ext uri="{D42A27DB-BD31-4B8C-83A1-F6EECF244321}">
-                <p14:modId xmlns:p14="http://schemas.microsoft.com/office/powerpoint/2010/main" val="3645575812"/>
+                <p14:modId xmlns:p14="http://schemas.microsoft.com/office/powerpoint/2010/main" val="3019978903"/>
               </p:ext>
             </p:extLst>
           </p:nvPr>
@@ -14028,7 +14028,11 @@
                       </a:pPr>
                       <a:r>
                         <a:rPr lang="en-US" altLang="ko-KR" sz="1800" b="1"/>
-                        <a:t>category_no</a:t>
+                        <a:t>category_</a:t>
+                      </a:r>
+                      <a:r>
+                        <a:rPr lang="en-US" altLang="ko" sz="1800" b="1"/>
+                        <a:t>id</a:t>
                       </a:r>
                       <a:endParaRPr lang="ko-KR" altLang="en-US" sz="1800" b="1"/>
                     </a:p>

</xml_diff>